<commit_message>
Added snake with menus
</commit_message>
<xml_diff>
--- a/week_9-10/Java Swing.pptx
+++ b/week_9-10/Java Swing.pptx
@@ -5,7 +5,7 @@
     <p:sldMasterId id="2147483648" r:id="rId1"/>
   </p:sldMasterIdLst>
   <p:notesMasterIdLst>
-    <p:notesMasterId r:id="rId13"/>
+    <p:notesMasterId r:id="rId15"/>
   </p:notesMasterIdLst>
   <p:sldIdLst>
     <p:sldId id="257" r:id="rId2"/>
@@ -18,7 +18,9 @@
     <p:sldId id="324" r:id="rId9"/>
     <p:sldId id="316" r:id="rId10"/>
     <p:sldId id="319" r:id="rId11"/>
-    <p:sldId id="320" r:id="rId12"/>
+    <p:sldId id="325" r:id="rId12"/>
+    <p:sldId id="326" r:id="rId13"/>
+    <p:sldId id="320" r:id="rId14"/>
   </p:sldIdLst>
   <p:sldSz cx="12192000" cy="6858000"/>
   <p:notesSz cx="6858000" cy="9144000"/>
@@ -717,6 +719,174 @@
             <a:fld id="{FE90CCE9-4AAE-4E1F-85AD-521A406D6524}" type="slidenum">
               <a:rPr lang="en-PH" smtClean="0"/>
               <a:t>11</a:t>
+            </a:fld>
+            <a:endParaRPr lang="en-PH"/>
+          </a:p>
+        </p:txBody>
+      </p:sp>
+    </p:spTree>
+    <p:extLst>
+      <p:ext uri="{BB962C8B-B14F-4D97-AF65-F5344CB8AC3E}">
+        <p14:creationId xmlns:p14="http://schemas.microsoft.com/office/powerpoint/2010/main" val="4229417441"/>
+      </p:ext>
+    </p:extLst>
+  </p:cSld>
+  <p:clrMapOvr>
+    <a:masterClrMapping/>
+  </p:clrMapOvr>
+</p:notes>
+</file>
+
+<file path=ppt/notesSlides/notesSlide12.xml><?xml version="1.0" encoding="utf-8"?>
+<p:notes xmlns:a="http://schemas.openxmlformats.org/drawingml/2006/main" xmlns:r="http://schemas.openxmlformats.org/officeDocument/2006/relationships" xmlns:p="http://schemas.openxmlformats.org/presentationml/2006/main">
+  <p:cSld>
+    <p:spTree>
+      <p:nvGrpSpPr>
+        <p:cNvPr id="1" name=""/>
+        <p:cNvGrpSpPr/>
+        <p:nvPr/>
+      </p:nvGrpSpPr>
+      <p:grpSpPr>
+        <a:xfrm>
+          <a:off x="0" y="0"/>
+          <a:ext cx="0" cy="0"/>
+          <a:chOff x="0" y="0"/>
+          <a:chExt cx="0" cy="0"/>
+        </a:xfrm>
+      </p:grpSpPr>
+      <p:sp>
+        <p:nvSpPr>
+          <p:cNvPr id="2" name="Slide Image Placeholder 1"/>
+          <p:cNvSpPr>
+            <a:spLocks noGrp="1" noRot="1" noChangeAspect="1"/>
+          </p:cNvSpPr>
+          <p:nvPr>
+            <p:ph type="sldImg"/>
+          </p:nvPr>
+        </p:nvSpPr>
+        <p:spPr/>
+      </p:sp>
+      <p:sp>
+        <p:nvSpPr>
+          <p:cNvPr id="3" name="Notes Placeholder 2"/>
+          <p:cNvSpPr>
+            <a:spLocks noGrp="1"/>
+          </p:cNvSpPr>
+          <p:nvPr>
+            <p:ph type="body" idx="1"/>
+          </p:nvPr>
+        </p:nvSpPr>
+        <p:spPr/>
+        <p:txBody>
+          <a:bodyPr/>
+          <a:lstStyle/>
+          <a:p>
+            <a:endParaRPr lang="en-PH" dirty="0"/>
+          </a:p>
+        </p:txBody>
+      </p:sp>
+      <p:sp>
+        <p:nvSpPr>
+          <p:cNvPr id="4" name="Slide Number Placeholder 3"/>
+          <p:cNvSpPr>
+            <a:spLocks noGrp="1"/>
+          </p:cNvSpPr>
+          <p:nvPr>
+            <p:ph type="sldNum" sz="quarter" idx="5"/>
+          </p:nvPr>
+        </p:nvSpPr>
+        <p:spPr/>
+        <p:txBody>
+          <a:bodyPr/>
+          <a:lstStyle/>
+          <a:p>
+            <a:fld id="{FE90CCE9-4AAE-4E1F-85AD-521A406D6524}" type="slidenum">
+              <a:rPr lang="en-PH" smtClean="0"/>
+              <a:t>12</a:t>
+            </a:fld>
+            <a:endParaRPr lang="en-PH"/>
+          </a:p>
+        </p:txBody>
+      </p:sp>
+    </p:spTree>
+    <p:extLst>
+      <p:ext uri="{BB962C8B-B14F-4D97-AF65-F5344CB8AC3E}">
+        <p14:creationId xmlns:p14="http://schemas.microsoft.com/office/powerpoint/2010/main" val="820915893"/>
+      </p:ext>
+    </p:extLst>
+  </p:cSld>
+  <p:clrMapOvr>
+    <a:masterClrMapping/>
+  </p:clrMapOvr>
+</p:notes>
+</file>
+
+<file path=ppt/notesSlides/notesSlide13.xml><?xml version="1.0" encoding="utf-8"?>
+<p:notes xmlns:a="http://schemas.openxmlformats.org/drawingml/2006/main" xmlns:r="http://schemas.openxmlformats.org/officeDocument/2006/relationships" xmlns:p="http://schemas.openxmlformats.org/presentationml/2006/main">
+  <p:cSld>
+    <p:spTree>
+      <p:nvGrpSpPr>
+        <p:cNvPr id="1" name=""/>
+        <p:cNvGrpSpPr/>
+        <p:nvPr/>
+      </p:nvGrpSpPr>
+      <p:grpSpPr>
+        <a:xfrm>
+          <a:off x="0" y="0"/>
+          <a:ext cx="0" cy="0"/>
+          <a:chOff x="0" y="0"/>
+          <a:chExt cx="0" cy="0"/>
+        </a:xfrm>
+      </p:grpSpPr>
+      <p:sp>
+        <p:nvSpPr>
+          <p:cNvPr id="2" name="Slide Image Placeholder 1"/>
+          <p:cNvSpPr>
+            <a:spLocks noGrp="1" noRot="1" noChangeAspect="1"/>
+          </p:cNvSpPr>
+          <p:nvPr>
+            <p:ph type="sldImg"/>
+          </p:nvPr>
+        </p:nvSpPr>
+        <p:spPr/>
+      </p:sp>
+      <p:sp>
+        <p:nvSpPr>
+          <p:cNvPr id="3" name="Notes Placeholder 2"/>
+          <p:cNvSpPr>
+            <a:spLocks noGrp="1"/>
+          </p:cNvSpPr>
+          <p:nvPr>
+            <p:ph type="body" idx="1"/>
+          </p:nvPr>
+        </p:nvSpPr>
+        <p:spPr/>
+        <p:txBody>
+          <a:bodyPr/>
+          <a:lstStyle/>
+          <a:p>
+            <a:endParaRPr lang="en-PH" dirty="0"/>
+          </a:p>
+        </p:txBody>
+      </p:sp>
+      <p:sp>
+        <p:nvSpPr>
+          <p:cNvPr id="4" name="Slide Number Placeholder 3"/>
+          <p:cNvSpPr>
+            <a:spLocks noGrp="1"/>
+          </p:cNvSpPr>
+          <p:nvPr>
+            <p:ph type="sldNum" sz="quarter" idx="5"/>
+          </p:nvPr>
+        </p:nvSpPr>
+        <p:spPr/>
+        <p:txBody>
+          <a:bodyPr/>
+          <a:lstStyle/>
+          <a:p>
+            <a:fld id="{FE90CCE9-4AAE-4E1F-85AD-521A406D6524}" type="slidenum">
+              <a:rPr lang="en-PH" smtClean="0"/>
+              <a:t>13</a:t>
             </a:fld>
             <a:endParaRPr lang="en-PH"/>
           </a:p>
@@ -5103,6 +5273,491 @@
           <a:p>
             <a:pPr algn="r"/>
             <a:r>
+              <a:rPr lang="en-PH" b="1" dirty="0">
+                <a:solidFill>
+                  <a:schemeClr val="tx1"/>
+                </a:solidFill>
+              </a:rPr>
+              <a:t>CCPRGG2L</a:t>
+            </a:r>
+            <a:endParaRPr lang="en-PH" dirty="0"/>
+          </a:p>
+        </p:txBody>
+      </p:sp>
+      <p:sp>
+        <p:nvSpPr>
+          <p:cNvPr id="5" name="TextBox 4">
+            <a:extLst>
+              <a:ext uri="{FF2B5EF4-FFF2-40B4-BE49-F238E27FC236}">
+                <a16:creationId xmlns:a16="http://schemas.microsoft.com/office/drawing/2014/main" id="{ED3F40B5-67A7-B164-22A6-B9B3B49F64FF}"/>
+              </a:ext>
+            </a:extLst>
+          </p:cNvPr>
+          <p:cNvSpPr txBox="1"/>
+          <p:nvPr/>
+        </p:nvSpPr>
+        <p:spPr>
+          <a:xfrm>
+            <a:off x="1523999" y="1793174"/>
+            <a:ext cx="9143999" cy="3170099"/>
+          </a:xfrm>
+          <a:prstGeom prst="rect">
+            <a:avLst/>
+          </a:prstGeom>
+          <a:noFill/>
+        </p:spPr>
+        <p:txBody>
+          <a:bodyPr wrap="square" rtlCol="0">
+            <a:spAutoFit/>
+          </a:bodyPr>
+          <a:lstStyle/>
+          <a:p>
+            <a:pPr marL="457200" indent="-457200">
+              <a:buFont typeface="Wingdings" panose="05000000000000000000" pitchFamily="2" charset="2"/>
+              <a:buChar char="q"/>
+            </a:pPr>
+            <a:r>
+              <a:rPr lang="en-PH" sz="2500" dirty="0"/>
+              <a:t>Changing the state of an object in java is known as an event</a:t>
+            </a:r>
+          </a:p>
+          <a:p>
+            <a:pPr marL="457200" indent="-457200">
+              <a:buFont typeface="Wingdings" panose="05000000000000000000" pitchFamily="2" charset="2"/>
+              <a:buChar char="q"/>
+            </a:pPr>
+            <a:endParaRPr lang="en-PH" sz="2500" dirty="0"/>
+          </a:p>
+          <a:p>
+            <a:pPr marL="457200" indent="-457200">
+              <a:buFont typeface="Wingdings" panose="05000000000000000000" pitchFamily="2" charset="2"/>
+              <a:buChar char="q"/>
+            </a:pPr>
+            <a:r>
+              <a:rPr lang="en-PH" sz="2500" dirty="0"/>
+              <a:t>Clicking a button, dragging a mouse are all examples of events.</a:t>
+            </a:r>
+          </a:p>
+          <a:p>
+            <a:pPr marL="457200" indent="-457200">
+              <a:buFont typeface="Wingdings" panose="05000000000000000000" pitchFamily="2" charset="2"/>
+              <a:buChar char="q"/>
+            </a:pPr>
+            <a:endParaRPr lang="en-PH" sz="2500" dirty="0"/>
+          </a:p>
+          <a:p>
+            <a:pPr marL="457200" indent="-457200">
+              <a:buFont typeface="Wingdings" panose="05000000000000000000" pitchFamily="2" charset="2"/>
+              <a:buChar char="q"/>
+            </a:pPr>
+            <a:r>
+              <a:rPr lang="en-PH" sz="2500" dirty="0"/>
+              <a:t>For every event, there is a listener that will respond to an event.</a:t>
+            </a:r>
+          </a:p>
+          <a:p>
+            <a:pPr marL="457200" indent="-457200">
+              <a:buFont typeface="Wingdings" panose="05000000000000000000" pitchFamily="2" charset="2"/>
+              <a:buChar char="q"/>
+            </a:pPr>
+            <a:endParaRPr lang="en-PH" sz="2500" dirty="0"/>
+          </a:p>
+          <a:p>
+            <a:pPr marL="457200" indent="-457200">
+              <a:buFont typeface="Wingdings" panose="05000000000000000000" pitchFamily="2" charset="2"/>
+              <a:buChar char="q"/>
+            </a:pPr>
+            <a:r>
+              <a:rPr lang="en-PH" sz="2500" dirty="0"/>
+              <a:t>The process of identifying an event and listening to an event is called event handling</a:t>
+            </a:r>
+          </a:p>
+        </p:txBody>
+      </p:sp>
+    </p:spTree>
+    <p:extLst>
+      <p:ext uri="{BB962C8B-B14F-4D97-AF65-F5344CB8AC3E}">
+        <p14:creationId xmlns:p14="http://schemas.microsoft.com/office/powerpoint/2010/main" val="597365296"/>
+      </p:ext>
+    </p:extLst>
+  </p:cSld>
+  <p:clrMapOvr>
+    <a:masterClrMapping/>
+  </p:clrMapOvr>
+</p:sld>
+</file>
+
+<file path=ppt/slides/slide12.xml><?xml version="1.0" encoding="utf-8"?>
+<p:sld xmlns:a="http://schemas.openxmlformats.org/drawingml/2006/main" xmlns:r="http://schemas.openxmlformats.org/officeDocument/2006/relationships" xmlns:p="http://schemas.openxmlformats.org/presentationml/2006/main">
+  <p:cSld>
+    <p:bg>
+      <p:bgPr>
+        <a:blipFill dpi="0" rotWithShape="1">
+          <a:blip r:embed="rId3">
+            <a:alphaModFix amt="99000"/>
+            <a:lum/>
+          </a:blip>
+          <a:srcRect/>
+          <a:stretch>
+            <a:fillRect t="89000" r="85000" b="-1000"/>
+          </a:stretch>
+        </a:blipFill>
+        <a:effectLst/>
+      </p:bgPr>
+    </p:bg>
+    <p:spTree>
+      <p:nvGrpSpPr>
+        <p:cNvPr id="1" name=""/>
+        <p:cNvGrpSpPr/>
+        <p:nvPr/>
+      </p:nvGrpSpPr>
+      <p:grpSpPr>
+        <a:xfrm>
+          <a:off x="0" y="0"/>
+          <a:ext cx="0" cy="0"/>
+          <a:chOff x="0" y="0"/>
+          <a:chExt cx="0" cy="0"/>
+        </a:xfrm>
+      </p:grpSpPr>
+      <p:sp>
+        <p:nvSpPr>
+          <p:cNvPr id="2" name="Title 1">
+            <a:extLst>
+              <a:ext uri="{FF2B5EF4-FFF2-40B4-BE49-F238E27FC236}">
+                <a16:creationId xmlns:a16="http://schemas.microsoft.com/office/drawing/2014/main" id="{6A3DCE86-C2BA-4713-9E7A-73589E8D6CCF}"/>
+              </a:ext>
+            </a:extLst>
+          </p:cNvPr>
+          <p:cNvSpPr>
+            <a:spLocks noGrp="1"/>
+          </p:cNvSpPr>
+          <p:nvPr>
+            <p:ph type="ctrTitle"/>
+          </p:nvPr>
+        </p:nvSpPr>
+        <p:spPr>
+          <a:xfrm>
+            <a:off x="1524000" y="497150"/>
+            <a:ext cx="9144000" cy="718459"/>
+          </a:xfrm>
+        </p:spPr>
+        <p:txBody>
+          <a:bodyPr>
+            <a:normAutofit fontScale="90000"/>
+          </a:bodyPr>
+          <a:lstStyle/>
+          <a:p>
+            <a:r>
+              <a:rPr lang="en-PH" b="1" dirty="0"/>
+              <a:t>Types of Events</a:t>
+            </a:r>
+          </a:p>
+        </p:txBody>
+      </p:sp>
+      <p:sp>
+        <p:nvSpPr>
+          <p:cNvPr id="4" name="Footer Placeholder 3">
+            <a:extLst>
+              <a:ext uri="{FF2B5EF4-FFF2-40B4-BE49-F238E27FC236}">
+                <a16:creationId xmlns:a16="http://schemas.microsoft.com/office/drawing/2014/main" id="{638E7DE1-45EE-476A-A474-0F3C264AEDA3}"/>
+              </a:ext>
+            </a:extLst>
+          </p:cNvPr>
+          <p:cNvSpPr>
+            <a:spLocks noGrp="1"/>
+          </p:cNvSpPr>
+          <p:nvPr>
+            <p:ph type="ftr" sz="quarter" idx="11"/>
+          </p:nvPr>
+        </p:nvSpPr>
+        <p:spPr>
+          <a:xfrm>
+            <a:off x="0" y="6139541"/>
+            <a:ext cx="12192000" cy="718459"/>
+          </a:xfrm>
+          <a:ln w="28575">
+            <a:solidFill>
+              <a:schemeClr val="accent5">
+                <a:lumMod val="50000"/>
+              </a:schemeClr>
+            </a:solidFill>
+          </a:ln>
+        </p:spPr>
+        <p:txBody>
+          <a:bodyPr/>
+          <a:lstStyle/>
+          <a:p>
+            <a:pPr algn="r"/>
+            <a:r>
+              <a:rPr lang="en-PH" b="1">
+                <a:solidFill>
+                  <a:schemeClr val="tx1"/>
+                </a:solidFill>
+              </a:rPr>
+              <a:t>CCPRGG2L</a:t>
+            </a:r>
+            <a:endParaRPr lang="en-PH" dirty="0"/>
+          </a:p>
+        </p:txBody>
+      </p:sp>
+      <p:pic>
+        <p:nvPicPr>
+          <p:cNvPr id="8" name="Picture 7" descr="A picture containing icon&#10;&#10;Description automatically generated">
+            <a:extLst>
+              <a:ext uri="{FF2B5EF4-FFF2-40B4-BE49-F238E27FC236}">
+                <a16:creationId xmlns:a16="http://schemas.microsoft.com/office/drawing/2014/main" id="{D93DB8B5-37A0-B946-0D0C-CC35D6F23DA5}"/>
+              </a:ext>
+            </a:extLst>
+          </p:cNvPr>
+          <p:cNvPicPr>
+            <a:picLocks noChangeAspect="1"/>
+          </p:cNvPicPr>
+          <p:nvPr/>
+        </p:nvPicPr>
+        <p:blipFill>
+          <a:blip r:embed="rId4">
+            <a:extLst>
+              <a:ext uri="{28A0092B-C50C-407E-A947-70E740481C1C}">
+                <a14:useLocalDpi xmlns:a14="http://schemas.microsoft.com/office/drawing/2010/main" val="0"/>
+              </a:ext>
+            </a:extLst>
+          </a:blip>
+          <a:stretch>
+            <a:fillRect/>
+          </a:stretch>
+        </p:blipFill>
+        <p:spPr>
+          <a:xfrm>
+            <a:off x="1209247" y="2090954"/>
+            <a:ext cx="3751976" cy="1875988"/>
+          </a:xfrm>
+          <a:prstGeom prst="rect">
+            <a:avLst/>
+          </a:prstGeom>
+        </p:spPr>
+      </p:pic>
+      <p:pic>
+        <p:nvPicPr>
+          <p:cNvPr id="10" name="Picture 9" descr="Graphical user interface&#10;&#10;Description automatically generated with medium confidence">
+            <a:extLst>
+              <a:ext uri="{FF2B5EF4-FFF2-40B4-BE49-F238E27FC236}">
+                <a16:creationId xmlns:a16="http://schemas.microsoft.com/office/drawing/2014/main" id="{C615A8B4-9D13-1E2A-0FB7-0ED4C72E4DEF}"/>
+              </a:ext>
+            </a:extLst>
+          </p:cNvPr>
+          <p:cNvPicPr>
+            <a:picLocks noChangeAspect="1"/>
+          </p:cNvPicPr>
+          <p:nvPr/>
+        </p:nvPicPr>
+        <p:blipFill>
+          <a:blip r:embed="rId5">
+            <a:extLst>
+              <a:ext uri="{28A0092B-C50C-407E-A947-70E740481C1C}">
+                <a14:useLocalDpi xmlns:a14="http://schemas.microsoft.com/office/drawing/2010/main" val="0"/>
+              </a:ext>
+            </a:extLst>
+          </a:blip>
+          <a:stretch>
+            <a:fillRect/>
+          </a:stretch>
+        </p:blipFill>
+        <p:spPr>
+          <a:xfrm>
+            <a:off x="7309719" y="1926770"/>
+            <a:ext cx="2939141" cy="2204356"/>
+          </a:xfrm>
+          <a:prstGeom prst="rect">
+            <a:avLst/>
+          </a:prstGeom>
+        </p:spPr>
+      </p:pic>
+      <p:sp>
+        <p:nvSpPr>
+          <p:cNvPr id="11" name="TextBox 10">
+            <a:extLst>
+              <a:ext uri="{FF2B5EF4-FFF2-40B4-BE49-F238E27FC236}">
+                <a16:creationId xmlns:a16="http://schemas.microsoft.com/office/drawing/2014/main" id="{13DED515-D839-EA13-08ED-D373629D6746}"/>
+              </a:ext>
+            </a:extLst>
+          </p:cNvPr>
+          <p:cNvSpPr txBox="1"/>
+          <p:nvPr/>
+        </p:nvSpPr>
+        <p:spPr>
+          <a:xfrm>
+            <a:off x="2668744" y="4499243"/>
+            <a:ext cx="1370900" cy="369332"/>
+          </a:xfrm>
+          <a:prstGeom prst="rect">
+            <a:avLst/>
+          </a:prstGeom>
+          <a:noFill/>
+        </p:spPr>
+        <p:txBody>
+          <a:bodyPr wrap="square" rtlCol="0">
+            <a:spAutoFit/>
+          </a:bodyPr>
+          <a:lstStyle/>
+          <a:p>
+            <a:r>
+              <a:rPr lang="en-PH" b="1"/>
+              <a:t>Button Click</a:t>
+            </a:r>
+            <a:endParaRPr lang="en-PH" b="1" dirty="0"/>
+          </a:p>
+        </p:txBody>
+      </p:sp>
+      <p:sp>
+        <p:nvSpPr>
+          <p:cNvPr id="12" name="TextBox 11">
+            <a:extLst>
+              <a:ext uri="{FF2B5EF4-FFF2-40B4-BE49-F238E27FC236}">
+                <a16:creationId xmlns:a16="http://schemas.microsoft.com/office/drawing/2014/main" id="{50D97FEC-1B8C-4256-2A4D-56B00C346196}"/>
+              </a:ext>
+            </a:extLst>
+          </p:cNvPr>
+          <p:cNvSpPr txBox="1"/>
+          <p:nvPr/>
+        </p:nvSpPr>
+        <p:spPr>
+          <a:xfrm>
+            <a:off x="7787714" y="4499243"/>
+            <a:ext cx="2170478" cy="369332"/>
+          </a:xfrm>
+          <a:prstGeom prst="rect">
+            <a:avLst/>
+          </a:prstGeom>
+          <a:noFill/>
+        </p:spPr>
+        <p:txBody>
+          <a:bodyPr wrap="square" rtlCol="0">
+            <a:spAutoFit/>
+          </a:bodyPr>
+          <a:lstStyle/>
+          <a:p>
+            <a:r>
+              <a:rPr lang="en-PH" b="1" dirty="0"/>
+              <a:t>Selecting a checkbox</a:t>
+            </a:r>
+          </a:p>
+        </p:txBody>
+      </p:sp>
+    </p:spTree>
+    <p:extLst>
+      <p:ext uri="{BB962C8B-B14F-4D97-AF65-F5344CB8AC3E}">
+        <p14:creationId xmlns:p14="http://schemas.microsoft.com/office/powerpoint/2010/main" val="1770695664"/>
+      </p:ext>
+    </p:extLst>
+  </p:cSld>
+  <p:clrMapOvr>
+    <a:masterClrMapping/>
+  </p:clrMapOvr>
+</p:sld>
+</file>
+
+<file path=ppt/slides/slide13.xml><?xml version="1.0" encoding="utf-8"?>
+<p:sld xmlns:a="http://schemas.openxmlformats.org/drawingml/2006/main" xmlns:r="http://schemas.openxmlformats.org/officeDocument/2006/relationships" xmlns:p="http://schemas.openxmlformats.org/presentationml/2006/main">
+  <p:cSld>
+    <p:bg>
+      <p:bgPr>
+        <a:blipFill dpi="0" rotWithShape="1">
+          <a:blip r:embed="rId3">
+            <a:alphaModFix amt="99000"/>
+            <a:lum/>
+          </a:blip>
+          <a:srcRect/>
+          <a:stretch>
+            <a:fillRect t="89000" r="85000" b="-1000"/>
+          </a:stretch>
+        </a:blipFill>
+        <a:effectLst/>
+      </p:bgPr>
+    </p:bg>
+    <p:spTree>
+      <p:nvGrpSpPr>
+        <p:cNvPr id="1" name=""/>
+        <p:cNvGrpSpPr/>
+        <p:nvPr/>
+      </p:nvGrpSpPr>
+      <p:grpSpPr>
+        <a:xfrm>
+          <a:off x="0" y="0"/>
+          <a:ext cx="0" cy="0"/>
+          <a:chOff x="0" y="0"/>
+          <a:chExt cx="0" cy="0"/>
+        </a:xfrm>
+      </p:grpSpPr>
+      <p:sp>
+        <p:nvSpPr>
+          <p:cNvPr id="2" name="Title 1">
+            <a:extLst>
+              <a:ext uri="{FF2B5EF4-FFF2-40B4-BE49-F238E27FC236}">
+                <a16:creationId xmlns:a16="http://schemas.microsoft.com/office/drawing/2014/main" id="{6A3DCE86-C2BA-4713-9E7A-73589E8D6CCF}"/>
+              </a:ext>
+            </a:extLst>
+          </p:cNvPr>
+          <p:cNvSpPr>
+            <a:spLocks noGrp="1"/>
+          </p:cNvSpPr>
+          <p:nvPr>
+            <p:ph type="ctrTitle"/>
+          </p:nvPr>
+        </p:nvSpPr>
+        <p:spPr>
+          <a:xfrm>
+            <a:off x="1524000" y="497150"/>
+            <a:ext cx="9144000" cy="718459"/>
+          </a:xfrm>
+        </p:spPr>
+        <p:txBody>
+          <a:bodyPr>
+            <a:normAutofit fontScale="90000"/>
+          </a:bodyPr>
+          <a:lstStyle/>
+          <a:p>
+            <a:r>
+              <a:rPr lang="en-PH" b="1" dirty="0"/>
+              <a:t>Event Handling</a:t>
+            </a:r>
+          </a:p>
+        </p:txBody>
+      </p:sp>
+      <p:sp>
+        <p:nvSpPr>
+          <p:cNvPr id="4" name="Footer Placeholder 3">
+            <a:extLst>
+              <a:ext uri="{FF2B5EF4-FFF2-40B4-BE49-F238E27FC236}">
+                <a16:creationId xmlns:a16="http://schemas.microsoft.com/office/drawing/2014/main" id="{638E7DE1-45EE-476A-A474-0F3C264AEDA3}"/>
+              </a:ext>
+            </a:extLst>
+          </p:cNvPr>
+          <p:cNvSpPr>
+            <a:spLocks noGrp="1"/>
+          </p:cNvSpPr>
+          <p:nvPr>
+            <p:ph type="ftr" sz="quarter" idx="11"/>
+          </p:nvPr>
+        </p:nvSpPr>
+        <p:spPr>
+          <a:xfrm>
+            <a:off x="0" y="6139541"/>
+            <a:ext cx="12192000" cy="718459"/>
+          </a:xfrm>
+          <a:ln w="28575">
+            <a:solidFill>
+              <a:schemeClr val="accent5">
+                <a:lumMod val="50000"/>
+              </a:schemeClr>
+            </a:solidFill>
+          </a:ln>
+        </p:spPr>
+        <p:txBody>
+          <a:bodyPr/>
+          <a:lstStyle/>
+          <a:p>
+            <a:pPr algn="r"/>
+            <a:r>
               <a:rPr lang="en-PH" b="1">
                 <a:solidFill>
                   <a:schemeClr val="tx1"/>
@@ -5234,7 +5889,7 @@
                     <a:p>
                       <a:pPr algn="ctr"/>
                       <a:r>
-                        <a:rPr lang="en-PH" b="1">
+                        <a:rPr lang="en-PH" b="1" dirty="0">
                           <a:solidFill>
                             <a:srgbClr val="7030A0"/>
                           </a:solidFill>

</xml_diff>